<commit_message>
Formula for sqrt 2
</commit_message>
<xml_diff>
--- a/Vortrag/Vortrag.pptx
+++ b/Vortrag/Vortrag.pptx
@@ -5,14 +5,16 @@
     <p:sldMasterId id="2147483648" r:id="rId1"/>
   </p:sldMasterIdLst>
   <p:notesMasterIdLst>
-    <p:notesMasterId r:id="rId7"/>
+    <p:notesMasterId r:id="rId9"/>
   </p:notesMasterIdLst>
   <p:sldIdLst>
     <p:sldId id="256" r:id="rId2"/>
     <p:sldId id="257" r:id="rId3"/>
-    <p:sldId id="260" r:id="rId4"/>
-    <p:sldId id="261" r:id="rId5"/>
-    <p:sldId id="262" r:id="rId6"/>
+    <p:sldId id="264" r:id="rId4"/>
+    <p:sldId id="265" r:id="rId5"/>
+    <p:sldId id="260" r:id="rId6"/>
+    <p:sldId id="261" r:id="rId7"/>
+    <p:sldId id="262" r:id="rId8"/>
   </p:sldIdLst>
   <p:sldSz cx="12192000" cy="6858000"/>
   <p:notesSz cx="6858000" cy="9144000"/>
@@ -5095,6 +5097,1489 @@
           <a:chExt cx="0" cy="0"/>
         </a:xfrm>
       </p:grpSpPr>
+      <mc:AlternateContent xmlns:mc="http://schemas.openxmlformats.org/markup-compatibility/2006">
+        <mc:Choice xmlns:a14="http://schemas.microsoft.com/office/drawing/2010/main" Requires="a14">
+          <p:sp>
+            <p:nvSpPr>
+              <p:cNvPr id="2" name="Titel 1">
+                <a:extLst>
+                  <a:ext uri="{FF2B5EF4-FFF2-40B4-BE49-F238E27FC236}">
+                    <a16:creationId xmlns:a16="http://schemas.microsoft.com/office/drawing/2014/main" id="{A161E9DB-2D80-98DC-892C-DEA9728AF58D}"/>
+                  </a:ext>
+                </a:extLst>
+              </p:cNvPr>
+              <p:cNvSpPr>
+                <a:spLocks noGrp="1"/>
+              </p:cNvSpPr>
+              <p:nvPr>
+                <p:ph type="title"/>
+              </p:nvPr>
+            </p:nvSpPr>
+            <p:spPr/>
+            <p:txBody>
+              <a:bodyPr/>
+              <a:lstStyle/>
+              <a:p>
+                <a:r>
+                  <a:rPr lang="de-DE" dirty="0"/>
+                  <a:t>Wie bestimmt man </a:t>
+                </a:r>
+                <a14:m>
+                  <m:oMath xmlns:m="http://schemas.openxmlformats.org/officeDocument/2006/math">
+                    <m:rad>
+                      <m:radPr>
+                        <m:degHide m:val="on"/>
+                        <m:ctrlPr>
+                          <a:rPr lang="de-DE" i="1" smtClean="0">
+                            <a:latin typeface="Cambria Math" panose="02040503050406030204" pitchFamily="18" charset="0"/>
+                          </a:rPr>
+                        </m:ctrlPr>
+                      </m:radPr>
+                      <m:deg/>
+                      <m:e>
+                        <m:r>
+                          <a:rPr lang="de-DE" b="0" i="1" smtClean="0">
+                            <a:latin typeface="Cambria Math" panose="02040503050406030204" pitchFamily="18" charset="0"/>
+                          </a:rPr>
+                          <m:t>2</m:t>
+                        </m:r>
+                      </m:e>
+                    </m:rad>
+                  </m:oMath>
+                </a14:m>
+                <a:r>
+                  <a:rPr lang="de-DE" dirty="0"/>
+                  <a:t>?</a:t>
+                </a:r>
+              </a:p>
+            </p:txBody>
+          </p:sp>
+        </mc:Choice>
+        <mc:Fallback>
+          <p:sp>
+            <p:nvSpPr>
+              <p:cNvPr id="2" name="Titel 1">
+                <a:extLst>
+                  <a:ext uri="{FF2B5EF4-FFF2-40B4-BE49-F238E27FC236}">
+                    <a16:creationId xmlns:a16="http://schemas.microsoft.com/office/drawing/2014/main" id="{A161E9DB-2D80-98DC-892C-DEA9728AF58D}"/>
+                  </a:ext>
+                </a:extLst>
+              </p:cNvPr>
+              <p:cNvSpPr>
+                <a:spLocks noGrp="1" noRot="1" noChangeAspect="1" noMove="1" noResize="1" noEditPoints="1" noAdjustHandles="1" noChangeArrowheads="1" noChangeShapeType="1" noTextEdit="1"/>
+              </p:cNvSpPr>
+              <p:nvPr>
+                <p:ph type="title"/>
+              </p:nvPr>
+            </p:nvSpPr>
+            <p:spPr>
+              <a:blipFill>
+                <a:blip r:embed="rId2"/>
+                <a:stretch>
+                  <a:fillRect l="-2413" b="-1905"/>
+                </a:stretch>
+              </a:blipFill>
+            </p:spPr>
+            <p:txBody>
+              <a:bodyPr/>
+              <a:lstStyle/>
+              <a:p>
+                <a:r>
+                  <a:rPr lang="de-DE">
+                    <a:noFill/>
+                  </a:rPr>
+                  <a:t> </a:t>
+                </a:r>
+              </a:p>
+            </p:txBody>
+          </p:sp>
+        </mc:Fallback>
+      </mc:AlternateContent>
+      <mc:AlternateContent xmlns:mc="http://schemas.openxmlformats.org/markup-compatibility/2006">
+        <mc:Choice xmlns:a14="http://schemas.microsoft.com/office/drawing/2010/main" Requires="a14">
+          <p:sp>
+            <p:nvSpPr>
+              <p:cNvPr id="3" name="Inhaltsplatzhalter 2">
+                <a:extLst>
+                  <a:ext uri="{FF2B5EF4-FFF2-40B4-BE49-F238E27FC236}">
+                    <a16:creationId xmlns:a16="http://schemas.microsoft.com/office/drawing/2014/main" id="{AE321ABA-405B-568E-F853-A4D682A067B3}"/>
+                  </a:ext>
+                </a:extLst>
+              </p:cNvPr>
+              <p:cNvSpPr>
+                <a:spLocks noGrp="1"/>
+              </p:cNvSpPr>
+              <p:nvPr>
+                <p:ph idx="1"/>
+              </p:nvPr>
+            </p:nvSpPr>
+            <p:spPr/>
+            <p:txBody>
+              <a:bodyPr/>
+              <a:lstStyle/>
+              <a:p>
+                <a:pPr marL="0" indent="0">
+                  <a:buNone/>
+                </a:pPr>
+                <a:br>
+                  <a:rPr lang="de-DE" i="1" dirty="0">
+                    <a:latin typeface="Cambria Math" panose="02040503050406030204" pitchFamily="18" charset="0"/>
+                  </a:rPr>
+                </a:br>
+                <a14:m>
+                  <m:oMathPara xmlns:m="http://schemas.openxmlformats.org/officeDocument/2006/math">
+                    <m:oMathParaPr>
+                      <m:jc m:val="centerGroup"/>
+                    </m:oMathParaPr>
+                    <m:oMath xmlns:m="http://schemas.openxmlformats.org/officeDocument/2006/math">
+                      <m:sSup>
+                        <m:sSupPr>
+                          <m:ctrlPr>
+                            <a:rPr lang="de-DE" i="1" smtClean="0">
+                              <a:latin typeface="Cambria Math" panose="02040503050406030204" pitchFamily="18" charset="0"/>
+                            </a:rPr>
+                          </m:ctrlPr>
+                        </m:sSupPr>
+                        <m:e>
+                          <m:d>
+                            <m:dPr>
+                              <m:ctrlPr>
+                                <a:rPr lang="de-DE" i="1" smtClean="0">
+                                  <a:latin typeface="Cambria Math" panose="02040503050406030204" pitchFamily="18" charset="0"/>
+                                </a:rPr>
+                              </m:ctrlPr>
+                            </m:dPr>
+                            <m:e>
+                              <m:m>
+                                <m:mPr>
+                                  <m:mcs>
+                                    <m:mc>
+                                      <m:mcPr>
+                                        <m:count m:val="2"/>
+                                        <m:mcJc m:val="center"/>
+                                      </m:mcPr>
+                                    </m:mc>
+                                  </m:mcs>
+                                  <m:ctrlPr>
+                                    <a:rPr lang="de-DE" i="1" smtClean="0">
+                                      <a:latin typeface="Cambria Math" panose="02040503050406030204" pitchFamily="18" charset="0"/>
+                                    </a:rPr>
+                                  </m:ctrlPr>
+                                </m:mPr>
+                                <m:mr>
+                                  <m:e>
+                                    <m:r>
+                                      <m:rPr>
+                                        <m:brk m:alnAt="7"/>
+                                      </m:rPr>
+                                      <a:rPr lang="de-DE" b="0" i="1" smtClean="0">
+                                        <a:latin typeface="Cambria Math" panose="02040503050406030204" pitchFamily="18" charset="0"/>
+                                      </a:rPr>
+                                      <m:t>0</m:t>
+                                    </m:r>
+                                  </m:e>
+                                  <m:e>
+                                    <m:r>
+                                      <a:rPr lang="de-DE" b="0" i="1" smtClean="0">
+                                        <a:latin typeface="Cambria Math" panose="02040503050406030204" pitchFamily="18" charset="0"/>
+                                      </a:rPr>
+                                      <m:t>1</m:t>
+                                    </m:r>
+                                  </m:e>
+                                </m:mr>
+                                <m:mr>
+                                  <m:e>
+                                    <m:r>
+                                      <a:rPr lang="de-DE" b="0" i="1" smtClean="0">
+                                        <a:latin typeface="Cambria Math" panose="02040503050406030204" pitchFamily="18" charset="0"/>
+                                      </a:rPr>
+                                      <m:t>1</m:t>
+                                    </m:r>
+                                  </m:e>
+                                  <m:e>
+                                    <m:r>
+                                      <a:rPr lang="de-DE" b="0" i="1" smtClean="0">
+                                        <a:latin typeface="Cambria Math" panose="02040503050406030204" pitchFamily="18" charset="0"/>
+                                      </a:rPr>
+                                      <m:t>2</m:t>
+                                    </m:r>
+                                  </m:e>
+                                </m:mr>
+                              </m:m>
+                            </m:e>
+                          </m:d>
+                        </m:e>
+                        <m:sup>
+                          <m:r>
+                            <a:rPr lang="de-DE" b="0" i="1" smtClean="0">
+                              <a:latin typeface="Cambria Math" panose="02040503050406030204" pitchFamily="18" charset="0"/>
+                            </a:rPr>
+                            <m:t>𝑛</m:t>
+                          </m:r>
+                        </m:sup>
+                      </m:sSup>
+                      <m:r>
+                        <a:rPr lang="de-DE" b="0" i="1" smtClean="0">
+                          <a:latin typeface="Cambria Math" panose="02040503050406030204" pitchFamily="18" charset="0"/>
+                        </a:rPr>
+                        <m:t>=</m:t>
+                      </m:r>
+                      <m:d>
+                        <m:dPr>
+                          <m:ctrlPr>
+                            <a:rPr lang="de-DE" b="0" i="1" smtClean="0">
+                              <a:latin typeface="Cambria Math" panose="02040503050406030204" pitchFamily="18" charset="0"/>
+                            </a:rPr>
+                          </m:ctrlPr>
+                        </m:dPr>
+                        <m:e>
+                          <m:m>
+                            <m:mPr>
+                              <m:mcs>
+                                <m:mc>
+                                  <m:mcPr>
+                                    <m:count m:val="2"/>
+                                    <m:mcJc m:val="center"/>
+                                  </m:mcPr>
+                                </m:mc>
+                              </m:mcs>
+                              <m:ctrlPr>
+                                <a:rPr lang="de-DE" b="0" i="1" smtClean="0">
+                                  <a:latin typeface="Cambria Math" panose="02040503050406030204" pitchFamily="18" charset="0"/>
+                                </a:rPr>
+                              </m:ctrlPr>
+                            </m:mPr>
+                            <m:mr>
+                              <m:e>
+                                <m:sSub>
+                                  <m:sSubPr>
+                                    <m:ctrlPr>
+                                      <a:rPr lang="de-DE" b="0" i="1" smtClean="0">
+                                        <a:latin typeface="Cambria Math" panose="02040503050406030204" pitchFamily="18" charset="0"/>
+                                      </a:rPr>
+                                    </m:ctrlPr>
+                                  </m:sSubPr>
+                                  <m:e>
+                                    <m:r>
+                                      <a:rPr lang="de-DE" b="0" i="1" smtClean="0">
+                                        <a:latin typeface="Cambria Math" panose="02040503050406030204" pitchFamily="18" charset="0"/>
+                                      </a:rPr>
+                                      <m:t>𝑥</m:t>
+                                    </m:r>
+                                  </m:e>
+                                  <m:sub>
+                                    <m:r>
+                                      <a:rPr lang="de-DE" b="0" i="1" smtClean="0">
+                                        <a:latin typeface="Cambria Math" panose="02040503050406030204" pitchFamily="18" charset="0"/>
+                                      </a:rPr>
+                                      <m:t>𝑛</m:t>
+                                    </m:r>
+                                    <m:r>
+                                      <a:rPr lang="de-DE" b="0" i="1" smtClean="0">
+                                        <a:latin typeface="Cambria Math" panose="02040503050406030204" pitchFamily="18" charset="0"/>
+                                      </a:rPr>
+                                      <m:t>−1</m:t>
+                                    </m:r>
+                                  </m:sub>
+                                </m:sSub>
+                              </m:e>
+                              <m:e>
+                                <m:sSub>
+                                  <m:sSubPr>
+                                    <m:ctrlPr>
+                                      <a:rPr lang="de-DE" b="0" i="1" smtClean="0">
+                                        <a:latin typeface="Cambria Math" panose="02040503050406030204" pitchFamily="18" charset="0"/>
+                                      </a:rPr>
+                                    </m:ctrlPr>
+                                  </m:sSubPr>
+                                  <m:e>
+                                    <m:r>
+                                      <a:rPr lang="de-DE" b="0" i="1" smtClean="0">
+                                        <a:latin typeface="Cambria Math" panose="02040503050406030204" pitchFamily="18" charset="0"/>
+                                      </a:rPr>
+                                      <m:t>𝑥</m:t>
+                                    </m:r>
+                                  </m:e>
+                                  <m:sub>
+                                    <m:r>
+                                      <a:rPr lang="de-DE" b="0" i="1" smtClean="0">
+                                        <a:latin typeface="Cambria Math" panose="02040503050406030204" pitchFamily="18" charset="0"/>
+                                      </a:rPr>
+                                      <m:t>𝑛</m:t>
+                                    </m:r>
+                                  </m:sub>
+                                </m:sSub>
+                              </m:e>
+                            </m:mr>
+                            <m:mr>
+                              <m:e>
+                                <m:sSub>
+                                  <m:sSubPr>
+                                    <m:ctrlPr>
+                                      <a:rPr lang="de-DE" b="0" i="1" smtClean="0">
+                                        <a:latin typeface="Cambria Math" panose="02040503050406030204" pitchFamily="18" charset="0"/>
+                                      </a:rPr>
+                                    </m:ctrlPr>
+                                  </m:sSubPr>
+                                  <m:e>
+                                    <m:r>
+                                      <a:rPr lang="de-DE" b="0" i="1" smtClean="0">
+                                        <a:latin typeface="Cambria Math" panose="02040503050406030204" pitchFamily="18" charset="0"/>
+                                      </a:rPr>
+                                      <m:t>𝑥</m:t>
+                                    </m:r>
+                                  </m:e>
+                                  <m:sub>
+                                    <m:r>
+                                      <a:rPr lang="de-DE" b="0" i="1" smtClean="0">
+                                        <a:latin typeface="Cambria Math" panose="02040503050406030204" pitchFamily="18" charset="0"/>
+                                      </a:rPr>
+                                      <m:t>𝑛</m:t>
+                                    </m:r>
+                                  </m:sub>
+                                </m:sSub>
+                              </m:e>
+                              <m:e>
+                                <m:sSub>
+                                  <m:sSubPr>
+                                    <m:ctrlPr>
+                                      <a:rPr lang="de-DE" b="0" i="1" smtClean="0">
+                                        <a:latin typeface="Cambria Math" panose="02040503050406030204" pitchFamily="18" charset="0"/>
+                                      </a:rPr>
+                                    </m:ctrlPr>
+                                  </m:sSubPr>
+                                  <m:e>
+                                    <m:r>
+                                      <a:rPr lang="de-DE" b="0" i="1" smtClean="0">
+                                        <a:latin typeface="Cambria Math" panose="02040503050406030204" pitchFamily="18" charset="0"/>
+                                      </a:rPr>
+                                      <m:t>𝑥</m:t>
+                                    </m:r>
+                                  </m:e>
+                                  <m:sub>
+                                    <m:r>
+                                      <a:rPr lang="de-DE" b="0" i="1" smtClean="0">
+                                        <a:latin typeface="Cambria Math" panose="02040503050406030204" pitchFamily="18" charset="0"/>
+                                      </a:rPr>
+                                      <m:t>𝑛</m:t>
+                                    </m:r>
+                                    <m:r>
+                                      <a:rPr lang="de-DE" b="0" i="1" smtClean="0">
+                                        <a:latin typeface="Cambria Math" panose="02040503050406030204" pitchFamily="18" charset="0"/>
+                                      </a:rPr>
+                                      <m:t>+1</m:t>
+                                    </m:r>
+                                  </m:sub>
+                                </m:sSub>
+                              </m:e>
+                            </m:mr>
+                          </m:m>
+                        </m:e>
+                      </m:d>
+                      <m:r>
+                        <a:rPr lang="de-DE" b="0" i="1" smtClean="0">
+                          <a:latin typeface="Cambria Math" panose="02040503050406030204" pitchFamily="18" charset="0"/>
+                          <a:ea typeface="Cambria Math" panose="02040503050406030204" pitchFamily="18" charset="0"/>
+                        </a:rPr>
+                        <m:t>⇒</m:t>
+                      </m:r>
+                      <m:func>
+                        <m:funcPr>
+                          <m:ctrlPr>
+                            <a:rPr lang="de-DE" b="0" i="1" smtClean="0">
+                              <a:latin typeface="Cambria Math" panose="02040503050406030204" pitchFamily="18" charset="0"/>
+                              <a:ea typeface="Cambria Math" panose="02040503050406030204" pitchFamily="18" charset="0"/>
+                            </a:rPr>
+                          </m:ctrlPr>
+                        </m:funcPr>
+                        <m:fName>
+                          <m:limLow>
+                            <m:limLowPr>
+                              <m:ctrlPr>
+                                <a:rPr lang="de-DE" b="0" i="1" smtClean="0">
+                                  <a:latin typeface="Cambria Math" panose="02040503050406030204" pitchFamily="18" charset="0"/>
+                                  <a:ea typeface="Cambria Math" panose="02040503050406030204" pitchFamily="18" charset="0"/>
+                                </a:rPr>
+                              </m:ctrlPr>
+                            </m:limLowPr>
+                            <m:e>
+                              <m:r>
+                                <m:rPr>
+                                  <m:sty m:val="p"/>
+                                </m:rPr>
+                                <a:rPr lang="de-DE" b="0" i="0" smtClean="0">
+                                  <a:latin typeface="Cambria Math" panose="02040503050406030204" pitchFamily="18" charset="0"/>
+                                  <a:ea typeface="Cambria Math" panose="02040503050406030204" pitchFamily="18" charset="0"/>
+                                </a:rPr>
+                                <m:t>lim</m:t>
+                              </m:r>
+                            </m:e>
+                            <m:lim>
+                              <m:r>
+                                <a:rPr lang="de-DE" b="0" i="1" smtClean="0">
+                                  <a:latin typeface="Cambria Math" panose="02040503050406030204" pitchFamily="18" charset="0"/>
+                                  <a:ea typeface="Cambria Math" panose="02040503050406030204" pitchFamily="18" charset="0"/>
+                                </a:rPr>
+                                <m:t>𝑛</m:t>
+                              </m:r>
+                              <m:r>
+                                <a:rPr lang="de-DE" b="0" i="1" smtClean="0">
+                                  <a:latin typeface="Cambria Math" panose="02040503050406030204" pitchFamily="18" charset="0"/>
+                                  <a:ea typeface="Cambria Math" panose="02040503050406030204" pitchFamily="18" charset="0"/>
+                                </a:rPr>
+                                <m:t>→∞</m:t>
+                              </m:r>
+                            </m:lim>
+                          </m:limLow>
+                        </m:fName>
+                        <m:e>
+                          <m:r>
+                            <a:rPr lang="de-DE" b="0" i="1" smtClean="0">
+                              <a:latin typeface="Cambria Math" panose="02040503050406030204" pitchFamily="18" charset="0"/>
+                              <a:ea typeface="Cambria Math" panose="02040503050406030204" pitchFamily="18" charset="0"/>
+                            </a:rPr>
+                            <m:t>1+</m:t>
+                          </m:r>
+                          <m:f>
+                            <m:fPr>
+                              <m:ctrlPr>
+                                <a:rPr lang="de-DE" b="0" i="1" smtClean="0">
+                                  <a:latin typeface="Cambria Math" panose="02040503050406030204" pitchFamily="18" charset="0"/>
+                                  <a:ea typeface="Cambria Math" panose="02040503050406030204" pitchFamily="18" charset="0"/>
+                                </a:rPr>
+                              </m:ctrlPr>
+                            </m:fPr>
+                            <m:num>
+                              <m:sSub>
+                                <m:sSubPr>
+                                  <m:ctrlPr>
+                                    <a:rPr lang="de-DE" b="0" i="1" smtClean="0">
+                                      <a:latin typeface="Cambria Math" panose="02040503050406030204" pitchFamily="18" charset="0"/>
+                                      <a:ea typeface="Cambria Math" panose="02040503050406030204" pitchFamily="18" charset="0"/>
+                                    </a:rPr>
+                                  </m:ctrlPr>
+                                </m:sSubPr>
+                                <m:e>
+                                  <m:r>
+                                    <a:rPr lang="de-DE" b="0" i="1" smtClean="0">
+                                      <a:latin typeface="Cambria Math" panose="02040503050406030204" pitchFamily="18" charset="0"/>
+                                      <a:ea typeface="Cambria Math" panose="02040503050406030204" pitchFamily="18" charset="0"/>
+                                    </a:rPr>
+                                    <m:t>𝑥</m:t>
+                                  </m:r>
+                                </m:e>
+                                <m:sub>
+                                  <m:r>
+                                    <a:rPr lang="de-DE" b="0" i="1" smtClean="0">
+                                      <a:latin typeface="Cambria Math" panose="02040503050406030204" pitchFamily="18" charset="0"/>
+                                      <a:ea typeface="Cambria Math" panose="02040503050406030204" pitchFamily="18" charset="0"/>
+                                    </a:rPr>
+                                    <m:t>𝑛</m:t>
+                                  </m:r>
+                                </m:sub>
+                              </m:sSub>
+                            </m:num>
+                            <m:den>
+                              <m:sSub>
+                                <m:sSubPr>
+                                  <m:ctrlPr>
+                                    <a:rPr lang="de-DE" b="0" i="1" smtClean="0">
+                                      <a:latin typeface="Cambria Math" panose="02040503050406030204" pitchFamily="18" charset="0"/>
+                                      <a:ea typeface="Cambria Math" panose="02040503050406030204" pitchFamily="18" charset="0"/>
+                                    </a:rPr>
+                                  </m:ctrlPr>
+                                </m:sSubPr>
+                                <m:e>
+                                  <m:r>
+                                    <a:rPr lang="de-DE" b="0" i="1" smtClean="0">
+                                      <a:latin typeface="Cambria Math" panose="02040503050406030204" pitchFamily="18" charset="0"/>
+                                      <a:ea typeface="Cambria Math" panose="02040503050406030204" pitchFamily="18" charset="0"/>
+                                    </a:rPr>
+                                    <m:t>𝑥</m:t>
+                                  </m:r>
+                                </m:e>
+                                <m:sub>
+                                  <m:r>
+                                    <a:rPr lang="de-DE" b="0" i="1" smtClean="0">
+                                      <a:latin typeface="Cambria Math" panose="02040503050406030204" pitchFamily="18" charset="0"/>
+                                      <a:ea typeface="Cambria Math" panose="02040503050406030204" pitchFamily="18" charset="0"/>
+                                    </a:rPr>
+                                    <m:t>𝑛</m:t>
+                                  </m:r>
+                                  <m:r>
+                                    <a:rPr lang="de-DE" b="0" i="1" smtClean="0">
+                                      <a:latin typeface="Cambria Math" panose="02040503050406030204" pitchFamily="18" charset="0"/>
+                                      <a:ea typeface="Cambria Math" panose="02040503050406030204" pitchFamily="18" charset="0"/>
+                                    </a:rPr>
+                                    <m:t>+1</m:t>
+                                  </m:r>
+                                </m:sub>
+                              </m:sSub>
+                            </m:den>
+                          </m:f>
+                          <m:r>
+                            <a:rPr lang="de-DE" b="0" i="1" smtClean="0">
+                              <a:latin typeface="Cambria Math" panose="02040503050406030204" pitchFamily="18" charset="0"/>
+                              <a:ea typeface="Cambria Math" panose="02040503050406030204" pitchFamily="18" charset="0"/>
+                            </a:rPr>
+                            <m:t>=</m:t>
+                          </m:r>
+                          <m:rad>
+                            <m:radPr>
+                              <m:degHide m:val="on"/>
+                              <m:ctrlPr>
+                                <a:rPr lang="de-DE" b="0" i="1" smtClean="0">
+                                  <a:latin typeface="Cambria Math" panose="02040503050406030204" pitchFamily="18" charset="0"/>
+                                  <a:ea typeface="Cambria Math" panose="02040503050406030204" pitchFamily="18" charset="0"/>
+                                </a:rPr>
+                              </m:ctrlPr>
+                            </m:radPr>
+                            <m:deg/>
+                            <m:e>
+                              <m:r>
+                                <a:rPr lang="de-DE" b="0" i="1" smtClean="0">
+                                  <a:latin typeface="Cambria Math" panose="02040503050406030204" pitchFamily="18" charset="0"/>
+                                  <a:ea typeface="Cambria Math" panose="02040503050406030204" pitchFamily="18" charset="0"/>
+                                </a:rPr>
+                                <m:t>2</m:t>
+                              </m:r>
+                            </m:e>
+                          </m:rad>
+                        </m:e>
+                      </m:func>
+                    </m:oMath>
+                  </m:oMathPara>
+                </a14:m>
+                <a:endParaRPr lang="de-DE" dirty="0"/>
+              </a:p>
+            </p:txBody>
+          </p:sp>
+        </mc:Choice>
+        <mc:Fallback>
+          <p:sp>
+            <p:nvSpPr>
+              <p:cNvPr id="3" name="Inhaltsplatzhalter 2">
+                <a:extLst>
+                  <a:ext uri="{FF2B5EF4-FFF2-40B4-BE49-F238E27FC236}">
+                    <a16:creationId xmlns:a16="http://schemas.microsoft.com/office/drawing/2014/main" id="{AE321ABA-405B-568E-F853-A4D682A067B3}"/>
+                  </a:ext>
+                </a:extLst>
+              </p:cNvPr>
+              <p:cNvSpPr>
+                <a:spLocks noGrp="1" noRot="1" noChangeAspect="1" noMove="1" noResize="1" noEditPoints="1" noAdjustHandles="1" noChangeArrowheads="1" noChangeShapeType="1" noTextEdit="1"/>
+              </p:cNvSpPr>
+              <p:nvPr>
+                <p:ph idx="1"/>
+              </p:nvPr>
+            </p:nvSpPr>
+            <p:spPr>
+              <a:blipFill>
+                <a:blip r:embed="rId3"/>
+                <a:stretch>
+                  <a:fillRect/>
+                </a:stretch>
+              </a:blipFill>
+            </p:spPr>
+            <p:txBody>
+              <a:bodyPr/>
+              <a:lstStyle/>
+              <a:p>
+                <a:r>
+                  <a:rPr lang="de-DE">
+                    <a:noFill/>
+                  </a:rPr>
+                  <a:t> </a:t>
+                </a:r>
+              </a:p>
+            </p:txBody>
+          </p:sp>
+        </mc:Fallback>
+      </mc:AlternateContent>
+      <p:sp>
+        <p:nvSpPr>
+          <p:cNvPr id="4" name="Datumsplatzhalter 3">
+            <a:extLst>
+              <a:ext uri="{FF2B5EF4-FFF2-40B4-BE49-F238E27FC236}">
+                <a16:creationId xmlns:a16="http://schemas.microsoft.com/office/drawing/2014/main" id="{00B5B41B-B4B8-042D-A728-4C625519A3C4}"/>
+              </a:ext>
+            </a:extLst>
+          </p:cNvPr>
+          <p:cNvSpPr>
+            <a:spLocks noGrp="1"/>
+          </p:cNvSpPr>
+          <p:nvPr>
+            <p:ph type="dt" sz="half" idx="10"/>
+          </p:nvPr>
+        </p:nvSpPr>
+        <p:spPr/>
+        <p:txBody>
+          <a:bodyPr/>
+          <a:lstStyle/>
+          <a:p>
+            <a:r>
+              <a:rPr lang="de-DE"/>
+              <a:t>22.08.2023</a:t>
+            </a:r>
+          </a:p>
+        </p:txBody>
+      </p:sp>
+      <p:sp>
+        <p:nvSpPr>
+          <p:cNvPr id="5" name="Fußzeilenplatzhalter 4">
+            <a:extLst>
+              <a:ext uri="{FF2B5EF4-FFF2-40B4-BE49-F238E27FC236}">
+                <a16:creationId xmlns:a16="http://schemas.microsoft.com/office/drawing/2014/main" id="{A03FC7B8-A005-3FBA-616E-D423A307B144}"/>
+              </a:ext>
+            </a:extLst>
+          </p:cNvPr>
+          <p:cNvSpPr>
+            <a:spLocks noGrp="1"/>
+          </p:cNvSpPr>
+          <p:nvPr>
+            <p:ph type="ftr" sz="quarter" idx="11"/>
+          </p:nvPr>
+        </p:nvSpPr>
+        <p:spPr>
+          <a:xfrm>
+            <a:off x="3260271" y="6356350"/>
+            <a:ext cx="5671458" cy="365125"/>
+          </a:xfrm>
+        </p:spPr>
+        <p:txBody>
+          <a:bodyPr/>
+          <a:lstStyle/>
+          <a:p>
+            <a:r>
+              <a:rPr lang="de-DE" dirty="0"/>
+              <a:t>Aufgabe A326 – Team 213 – Noah Schlenker – Leon B. Kniffki – Christian </a:t>
+            </a:r>
+            <a:r>
+              <a:rPr lang="de-DE" dirty="0" err="1"/>
+              <a:t>Krinitsin</a:t>
+            </a:r>
+            <a:endParaRPr lang="de-DE" dirty="0"/>
+          </a:p>
+        </p:txBody>
+      </p:sp>
+      <p:sp>
+        <p:nvSpPr>
+          <p:cNvPr id="6" name="Foliennummernplatzhalter 5">
+            <a:extLst>
+              <a:ext uri="{FF2B5EF4-FFF2-40B4-BE49-F238E27FC236}">
+                <a16:creationId xmlns:a16="http://schemas.microsoft.com/office/drawing/2014/main" id="{DB33F6F9-ED30-61D1-9476-2F261C86DE5D}"/>
+              </a:ext>
+            </a:extLst>
+          </p:cNvPr>
+          <p:cNvSpPr>
+            <a:spLocks noGrp="1"/>
+          </p:cNvSpPr>
+          <p:nvPr>
+            <p:ph type="sldNum" sz="quarter" idx="12"/>
+          </p:nvPr>
+        </p:nvSpPr>
+        <p:spPr/>
+        <p:txBody>
+          <a:bodyPr/>
+          <a:lstStyle/>
+          <a:p>
+            <a:fld id="{AE07E6DF-0E1A-AC44-B689-ED3A3483D2F3}" type="slidenum">
+              <a:rPr lang="de-DE" smtClean="0"/>
+              <a:t>3</a:t>
+            </a:fld>
+            <a:endParaRPr lang="de-DE"/>
+          </a:p>
+        </p:txBody>
+      </p:sp>
+    </p:spTree>
+    <p:extLst>
+      <p:ext uri="{BB962C8B-B14F-4D97-AF65-F5344CB8AC3E}">
+        <p14:creationId xmlns:p14="http://schemas.microsoft.com/office/powerpoint/2010/main" val="640342623"/>
+      </p:ext>
+    </p:extLst>
+  </p:cSld>
+  <p:clrMapOvr>
+    <a:masterClrMapping/>
+  </p:clrMapOvr>
+</p:sld>
+</file>
+
+<file path=ppt/slides/slide4.xml><?xml version="1.0" encoding="utf-8"?>
+<p:sld xmlns:a="http://schemas.openxmlformats.org/drawingml/2006/main" xmlns:r="http://schemas.openxmlformats.org/officeDocument/2006/relationships" xmlns:p="http://schemas.openxmlformats.org/presentationml/2006/main">
+  <p:cSld>
+    <p:spTree>
+      <p:nvGrpSpPr>
+        <p:cNvPr id="1" name=""/>
+        <p:cNvGrpSpPr/>
+        <p:nvPr/>
+      </p:nvGrpSpPr>
+      <p:grpSpPr>
+        <a:xfrm>
+          <a:off x="0" y="0"/>
+          <a:ext cx="0" cy="0"/>
+          <a:chOff x="0" y="0"/>
+          <a:chExt cx="0" cy="0"/>
+        </a:xfrm>
+      </p:grpSpPr>
+      <mc:AlternateContent xmlns:mc="http://schemas.openxmlformats.org/markup-compatibility/2006">
+        <mc:Choice xmlns:a14="http://schemas.microsoft.com/office/drawing/2010/main" Requires="a14">
+          <p:sp>
+            <p:nvSpPr>
+              <p:cNvPr id="2" name="Titel 1">
+                <a:extLst>
+                  <a:ext uri="{FF2B5EF4-FFF2-40B4-BE49-F238E27FC236}">
+                    <a16:creationId xmlns:a16="http://schemas.microsoft.com/office/drawing/2014/main" id="{A161E9DB-2D80-98DC-892C-DEA9728AF58D}"/>
+                  </a:ext>
+                </a:extLst>
+              </p:cNvPr>
+              <p:cNvSpPr>
+                <a:spLocks noGrp="1"/>
+              </p:cNvSpPr>
+              <p:nvPr>
+                <p:ph type="title"/>
+              </p:nvPr>
+            </p:nvSpPr>
+            <p:spPr/>
+            <p:txBody>
+              <a:bodyPr/>
+              <a:lstStyle/>
+              <a:p>
+                <a:r>
+                  <a:rPr lang="de-DE" dirty="0"/>
+                  <a:t>Wie bestimmt man </a:t>
+                </a:r>
+                <a14:m>
+                  <m:oMath xmlns:m="http://schemas.openxmlformats.org/officeDocument/2006/math">
+                    <m:rad>
+                      <m:radPr>
+                        <m:degHide m:val="on"/>
+                        <m:ctrlPr>
+                          <a:rPr lang="de-DE" i="1" smtClean="0">
+                            <a:latin typeface="Cambria Math" panose="02040503050406030204" pitchFamily="18" charset="0"/>
+                          </a:rPr>
+                        </m:ctrlPr>
+                      </m:radPr>
+                      <m:deg/>
+                      <m:e>
+                        <m:r>
+                          <a:rPr lang="de-DE" b="0" i="1" smtClean="0">
+                            <a:latin typeface="Cambria Math" panose="02040503050406030204" pitchFamily="18" charset="0"/>
+                          </a:rPr>
+                          <m:t>2</m:t>
+                        </m:r>
+                      </m:e>
+                    </m:rad>
+                  </m:oMath>
+                </a14:m>
+                <a:r>
+                  <a:rPr lang="de-DE" dirty="0"/>
+                  <a:t>?</a:t>
+                </a:r>
+              </a:p>
+            </p:txBody>
+          </p:sp>
+        </mc:Choice>
+        <mc:Fallback>
+          <p:sp>
+            <p:nvSpPr>
+              <p:cNvPr id="2" name="Titel 1">
+                <a:extLst>
+                  <a:ext uri="{FF2B5EF4-FFF2-40B4-BE49-F238E27FC236}">
+                    <a16:creationId xmlns:a16="http://schemas.microsoft.com/office/drawing/2014/main" id="{A161E9DB-2D80-98DC-892C-DEA9728AF58D}"/>
+                  </a:ext>
+                </a:extLst>
+              </p:cNvPr>
+              <p:cNvSpPr>
+                <a:spLocks noGrp="1" noRot="1" noChangeAspect="1" noMove="1" noResize="1" noEditPoints="1" noAdjustHandles="1" noChangeArrowheads="1" noChangeShapeType="1" noTextEdit="1"/>
+              </p:cNvSpPr>
+              <p:nvPr>
+                <p:ph type="title"/>
+              </p:nvPr>
+            </p:nvSpPr>
+            <p:spPr>
+              <a:blipFill>
+                <a:blip r:embed="rId2"/>
+                <a:stretch>
+                  <a:fillRect l="-2413" b="-1905"/>
+                </a:stretch>
+              </a:blipFill>
+            </p:spPr>
+            <p:txBody>
+              <a:bodyPr/>
+              <a:lstStyle/>
+              <a:p>
+                <a:r>
+                  <a:rPr lang="de-DE">
+                    <a:noFill/>
+                  </a:rPr>
+                  <a:t> </a:t>
+                </a:r>
+              </a:p>
+            </p:txBody>
+          </p:sp>
+        </mc:Fallback>
+      </mc:AlternateContent>
+      <mc:AlternateContent xmlns:mc="http://schemas.openxmlformats.org/markup-compatibility/2006">
+        <mc:Choice xmlns:a14="http://schemas.microsoft.com/office/drawing/2010/main" Requires="a14">
+          <p:sp>
+            <p:nvSpPr>
+              <p:cNvPr id="3" name="Inhaltsplatzhalter 2">
+                <a:extLst>
+                  <a:ext uri="{FF2B5EF4-FFF2-40B4-BE49-F238E27FC236}">
+                    <a16:creationId xmlns:a16="http://schemas.microsoft.com/office/drawing/2014/main" id="{AE321ABA-405B-568E-F853-A4D682A067B3}"/>
+                  </a:ext>
+                </a:extLst>
+              </p:cNvPr>
+              <p:cNvSpPr>
+                <a:spLocks noGrp="1"/>
+              </p:cNvSpPr>
+              <p:nvPr>
+                <p:ph idx="1"/>
+              </p:nvPr>
+            </p:nvSpPr>
+            <p:spPr/>
+            <p:txBody>
+              <a:bodyPr/>
+              <a:lstStyle/>
+              <a:p>
+                <a:pPr marL="0" indent="0">
+                  <a:buNone/>
+                </a:pPr>
+                <a:br>
+                  <a:rPr lang="de-DE" i="1" dirty="0">
+                    <a:latin typeface="Cambria Math" panose="02040503050406030204" pitchFamily="18" charset="0"/>
+                  </a:rPr>
+                </a:br>
+                <a14:m>
+                  <m:oMathPara xmlns:m="http://schemas.openxmlformats.org/officeDocument/2006/math">
+                    <m:oMathParaPr>
+                      <m:jc m:val="centerGroup"/>
+                    </m:oMathParaPr>
+                    <m:oMath xmlns:m="http://schemas.openxmlformats.org/officeDocument/2006/math">
+                      <m:sSup>
+                        <m:sSupPr>
+                          <m:ctrlPr>
+                            <a:rPr lang="de-DE" i="1" smtClean="0">
+                              <a:latin typeface="Cambria Math" panose="02040503050406030204" pitchFamily="18" charset="0"/>
+                            </a:rPr>
+                          </m:ctrlPr>
+                        </m:sSupPr>
+                        <m:e>
+                          <m:d>
+                            <m:dPr>
+                              <m:ctrlPr>
+                                <a:rPr lang="de-DE" i="1" smtClean="0">
+                                  <a:latin typeface="Cambria Math" panose="02040503050406030204" pitchFamily="18" charset="0"/>
+                                </a:rPr>
+                              </m:ctrlPr>
+                            </m:dPr>
+                            <m:e>
+                              <m:m>
+                                <m:mPr>
+                                  <m:mcs>
+                                    <m:mc>
+                                      <m:mcPr>
+                                        <m:count m:val="2"/>
+                                        <m:mcJc m:val="center"/>
+                                      </m:mcPr>
+                                    </m:mc>
+                                  </m:mcs>
+                                  <m:ctrlPr>
+                                    <a:rPr lang="de-DE" i="1" smtClean="0">
+                                      <a:latin typeface="Cambria Math" panose="02040503050406030204" pitchFamily="18" charset="0"/>
+                                    </a:rPr>
+                                  </m:ctrlPr>
+                                </m:mPr>
+                                <m:mr>
+                                  <m:e>
+                                    <m:r>
+                                      <m:rPr>
+                                        <m:brk m:alnAt="7"/>
+                                      </m:rPr>
+                                      <a:rPr lang="de-DE" b="0" i="1" smtClean="0">
+                                        <a:latin typeface="Cambria Math" panose="02040503050406030204" pitchFamily="18" charset="0"/>
+                                      </a:rPr>
+                                      <m:t>0</m:t>
+                                    </m:r>
+                                  </m:e>
+                                  <m:e>
+                                    <m:r>
+                                      <a:rPr lang="de-DE" b="0" i="1" smtClean="0">
+                                        <a:latin typeface="Cambria Math" panose="02040503050406030204" pitchFamily="18" charset="0"/>
+                                      </a:rPr>
+                                      <m:t>1</m:t>
+                                    </m:r>
+                                  </m:e>
+                                </m:mr>
+                                <m:mr>
+                                  <m:e>
+                                    <m:r>
+                                      <a:rPr lang="de-DE" b="0" i="1" smtClean="0">
+                                        <a:latin typeface="Cambria Math" panose="02040503050406030204" pitchFamily="18" charset="0"/>
+                                      </a:rPr>
+                                      <m:t>1</m:t>
+                                    </m:r>
+                                  </m:e>
+                                  <m:e>
+                                    <m:r>
+                                      <a:rPr lang="de-DE" b="0" i="1" smtClean="0">
+                                        <a:latin typeface="Cambria Math" panose="02040503050406030204" pitchFamily="18" charset="0"/>
+                                      </a:rPr>
+                                      <m:t>2</m:t>
+                                    </m:r>
+                                  </m:e>
+                                </m:mr>
+                              </m:m>
+                            </m:e>
+                          </m:d>
+                        </m:e>
+                        <m:sup>
+                          <m:r>
+                            <a:rPr lang="de-DE" b="0" i="1" smtClean="0">
+                              <a:latin typeface="Cambria Math" panose="02040503050406030204" pitchFamily="18" charset="0"/>
+                            </a:rPr>
+                            <m:t>𝑛</m:t>
+                          </m:r>
+                        </m:sup>
+                      </m:sSup>
+                      <m:r>
+                        <a:rPr lang="de-DE" b="0" i="1" smtClean="0">
+                          <a:latin typeface="Cambria Math" panose="02040503050406030204" pitchFamily="18" charset="0"/>
+                        </a:rPr>
+                        <m:t>=</m:t>
+                      </m:r>
+                      <m:d>
+                        <m:dPr>
+                          <m:ctrlPr>
+                            <a:rPr lang="de-DE" b="0" i="1" smtClean="0">
+                              <a:latin typeface="Cambria Math" panose="02040503050406030204" pitchFamily="18" charset="0"/>
+                            </a:rPr>
+                          </m:ctrlPr>
+                        </m:dPr>
+                        <m:e>
+                          <m:m>
+                            <m:mPr>
+                              <m:mcs>
+                                <m:mc>
+                                  <m:mcPr>
+                                    <m:count m:val="2"/>
+                                    <m:mcJc m:val="center"/>
+                                  </m:mcPr>
+                                </m:mc>
+                              </m:mcs>
+                              <m:ctrlPr>
+                                <a:rPr lang="de-DE" b="0" i="1" smtClean="0">
+                                  <a:latin typeface="Cambria Math" panose="02040503050406030204" pitchFamily="18" charset="0"/>
+                                </a:rPr>
+                              </m:ctrlPr>
+                            </m:mPr>
+                            <m:mr>
+                              <m:e>
+                                <m:sSub>
+                                  <m:sSubPr>
+                                    <m:ctrlPr>
+                                      <a:rPr lang="de-DE" b="0" i="1" smtClean="0">
+                                        <a:latin typeface="Cambria Math" panose="02040503050406030204" pitchFamily="18" charset="0"/>
+                                      </a:rPr>
+                                    </m:ctrlPr>
+                                  </m:sSubPr>
+                                  <m:e>
+                                    <m:r>
+                                      <a:rPr lang="de-DE" b="0" i="1" smtClean="0">
+                                        <a:latin typeface="Cambria Math" panose="02040503050406030204" pitchFamily="18" charset="0"/>
+                                      </a:rPr>
+                                      <m:t>𝑥</m:t>
+                                    </m:r>
+                                  </m:e>
+                                  <m:sub>
+                                    <m:r>
+                                      <a:rPr lang="de-DE" b="0" i="1" smtClean="0">
+                                        <a:latin typeface="Cambria Math" panose="02040503050406030204" pitchFamily="18" charset="0"/>
+                                      </a:rPr>
+                                      <m:t>𝑛</m:t>
+                                    </m:r>
+                                    <m:r>
+                                      <a:rPr lang="de-DE" b="0" i="1" smtClean="0">
+                                        <a:latin typeface="Cambria Math" panose="02040503050406030204" pitchFamily="18" charset="0"/>
+                                      </a:rPr>
+                                      <m:t>−1</m:t>
+                                    </m:r>
+                                  </m:sub>
+                                </m:sSub>
+                              </m:e>
+                              <m:e>
+                                <m:sSub>
+                                  <m:sSubPr>
+                                    <m:ctrlPr>
+                                      <a:rPr lang="de-DE" b="0" i="1" smtClean="0">
+                                        <a:latin typeface="Cambria Math" panose="02040503050406030204" pitchFamily="18" charset="0"/>
+                                      </a:rPr>
+                                    </m:ctrlPr>
+                                  </m:sSubPr>
+                                  <m:e>
+                                    <m:r>
+                                      <a:rPr lang="de-DE" b="0" i="1" smtClean="0">
+                                        <a:latin typeface="Cambria Math" panose="02040503050406030204" pitchFamily="18" charset="0"/>
+                                      </a:rPr>
+                                      <m:t>𝑥</m:t>
+                                    </m:r>
+                                  </m:e>
+                                  <m:sub>
+                                    <m:r>
+                                      <a:rPr lang="de-DE" b="0" i="1" smtClean="0">
+                                        <a:latin typeface="Cambria Math" panose="02040503050406030204" pitchFamily="18" charset="0"/>
+                                      </a:rPr>
+                                      <m:t>𝑛</m:t>
+                                    </m:r>
+                                  </m:sub>
+                                </m:sSub>
+                              </m:e>
+                            </m:mr>
+                            <m:mr>
+                              <m:e>
+                                <m:sSub>
+                                  <m:sSubPr>
+                                    <m:ctrlPr>
+                                      <a:rPr lang="de-DE" b="0" i="1" smtClean="0">
+                                        <a:latin typeface="Cambria Math" panose="02040503050406030204" pitchFamily="18" charset="0"/>
+                                      </a:rPr>
+                                    </m:ctrlPr>
+                                  </m:sSubPr>
+                                  <m:e>
+                                    <m:r>
+                                      <a:rPr lang="de-DE" b="0" i="1" smtClean="0">
+                                        <a:latin typeface="Cambria Math" panose="02040503050406030204" pitchFamily="18" charset="0"/>
+                                      </a:rPr>
+                                      <m:t>𝑥</m:t>
+                                    </m:r>
+                                  </m:e>
+                                  <m:sub>
+                                    <m:r>
+                                      <a:rPr lang="de-DE" b="0" i="1" smtClean="0">
+                                        <a:latin typeface="Cambria Math" panose="02040503050406030204" pitchFamily="18" charset="0"/>
+                                      </a:rPr>
+                                      <m:t>𝑛</m:t>
+                                    </m:r>
+                                  </m:sub>
+                                </m:sSub>
+                              </m:e>
+                              <m:e>
+                                <m:sSub>
+                                  <m:sSubPr>
+                                    <m:ctrlPr>
+                                      <a:rPr lang="de-DE" b="0" i="1" smtClean="0">
+                                        <a:latin typeface="Cambria Math" panose="02040503050406030204" pitchFamily="18" charset="0"/>
+                                      </a:rPr>
+                                    </m:ctrlPr>
+                                  </m:sSubPr>
+                                  <m:e>
+                                    <m:r>
+                                      <a:rPr lang="de-DE" b="0" i="1" smtClean="0">
+                                        <a:latin typeface="Cambria Math" panose="02040503050406030204" pitchFamily="18" charset="0"/>
+                                      </a:rPr>
+                                      <m:t>𝑥</m:t>
+                                    </m:r>
+                                  </m:e>
+                                  <m:sub>
+                                    <m:r>
+                                      <a:rPr lang="de-DE" b="0" i="1" smtClean="0">
+                                        <a:latin typeface="Cambria Math" panose="02040503050406030204" pitchFamily="18" charset="0"/>
+                                      </a:rPr>
+                                      <m:t>𝑛</m:t>
+                                    </m:r>
+                                    <m:r>
+                                      <a:rPr lang="de-DE" b="0" i="1" smtClean="0">
+                                        <a:latin typeface="Cambria Math" panose="02040503050406030204" pitchFamily="18" charset="0"/>
+                                      </a:rPr>
+                                      <m:t>+1</m:t>
+                                    </m:r>
+                                  </m:sub>
+                                </m:sSub>
+                              </m:e>
+                            </m:mr>
+                          </m:m>
+                        </m:e>
+                      </m:d>
+                      <m:r>
+                        <a:rPr lang="de-DE" b="0" i="1" smtClean="0">
+                          <a:latin typeface="Cambria Math" panose="02040503050406030204" pitchFamily="18" charset="0"/>
+                          <a:ea typeface="Cambria Math" panose="02040503050406030204" pitchFamily="18" charset="0"/>
+                        </a:rPr>
+                        <m:t>⇒</m:t>
+                      </m:r>
+                      <m:func>
+                        <m:funcPr>
+                          <m:ctrlPr>
+                            <a:rPr lang="de-DE" b="0" i="1" smtClean="0">
+                              <a:latin typeface="Cambria Math" panose="02040503050406030204" pitchFamily="18" charset="0"/>
+                              <a:ea typeface="Cambria Math" panose="02040503050406030204" pitchFamily="18" charset="0"/>
+                            </a:rPr>
+                          </m:ctrlPr>
+                        </m:funcPr>
+                        <m:fName>
+                          <m:limLow>
+                            <m:limLowPr>
+                              <m:ctrlPr>
+                                <a:rPr lang="de-DE" b="0" i="1" smtClean="0">
+                                  <a:latin typeface="Cambria Math" panose="02040503050406030204" pitchFamily="18" charset="0"/>
+                                  <a:ea typeface="Cambria Math" panose="02040503050406030204" pitchFamily="18" charset="0"/>
+                                </a:rPr>
+                              </m:ctrlPr>
+                            </m:limLowPr>
+                            <m:e>
+                              <m:r>
+                                <m:rPr>
+                                  <m:sty m:val="p"/>
+                                </m:rPr>
+                                <a:rPr lang="de-DE" b="0" i="0" smtClean="0">
+                                  <a:latin typeface="Cambria Math" panose="02040503050406030204" pitchFamily="18" charset="0"/>
+                                  <a:ea typeface="Cambria Math" panose="02040503050406030204" pitchFamily="18" charset="0"/>
+                                </a:rPr>
+                                <m:t>lim</m:t>
+                              </m:r>
+                            </m:e>
+                            <m:lim>
+                              <m:r>
+                                <a:rPr lang="de-DE" b="0" i="1" smtClean="0">
+                                  <a:latin typeface="Cambria Math" panose="02040503050406030204" pitchFamily="18" charset="0"/>
+                                  <a:ea typeface="Cambria Math" panose="02040503050406030204" pitchFamily="18" charset="0"/>
+                                </a:rPr>
+                                <m:t>𝑛</m:t>
+                              </m:r>
+                              <m:r>
+                                <a:rPr lang="de-DE" b="0" i="1" smtClean="0">
+                                  <a:latin typeface="Cambria Math" panose="02040503050406030204" pitchFamily="18" charset="0"/>
+                                  <a:ea typeface="Cambria Math" panose="02040503050406030204" pitchFamily="18" charset="0"/>
+                                </a:rPr>
+                                <m:t>→∞</m:t>
+                              </m:r>
+                            </m:lim>
+                          </m:limLow>
+                        </m:fName>
+                        <m:e>
+                          <m:r>
+                            <a:rPr lang="de-DE" b="0" i="1" smtClean="0">
+                              <a:latin typeface="Cambria Math" panose="02040503050406030204" pitchFamily="18" charset="0"/>
+                              <a:ea typeface="Cambria Math" panose="02040503050406030204" pitchFamily="18" charset="0"/>
+                            </a:rPr>
+                            <m:t>1+</m:t>
+                          </m:r>
+                          <m:f>
+                            <m:fPr>
+                              <m:ctrlPr>
+                                <a:rPr lang="de-DE" b="0" i="1" smtClean="0">
+                                  <a:latin typeface="Cambria Math" panose="02040503050406030204" pitchFamily="18" charset="0"/>
+                                  <a:ea typeface="Cambria Math" panose="02040503050406030204" pitchFamily="18" charset="0"/>
+                                </a:rPr>
+                              </m:ctrlPr>
+                            </m:fPr>
+                            <m:num>
+                              <m:sSub>
+                                <m:sSubPr>
+                                  <m:ctrlPr>
+                                    <a:rPr lang="de-DE" b="0" i="1" smtClean="0">
+                                      <a:latin typeface="Cambria Math" panose="02040503050406030204" pitchFamily="18" charset="0"/>
+                                      <a:ea typeface="Cambria Math" panose="02040503050406030204" pitchFamily="18" charset="0"/>
+                                    </a:rPr>
+                                  </m:ctrlPr>
+                                </m:sSubPr>
+                                <m:e>
+                                  <m:r>
+                                    <a:rPr lang="de-DE" b="0" i="1" smtClean="0">
+                                      <a:latin typeface="Cambria Math" panose="02040503050406030204" pitchFamily="18" charset="0"/>
+                                      <a:ea typeface="Cambria Math" panose="02040503050406030204" pitchFamily="18" charset="0"/>
+                                    </a:rPr>
+                                    <m:t>𝑥</m:t>
+                                  </m:r>
+                                </m:e>
+                                <m:sub>
+                                  <m:r>
+                                    <a:rPr lang="de-DE" b="0" i="1" smtClean="0">
+                                      <a:latin typeface="Cambria Math" panose="02040503050406030204" pitchFamily="18" charset="0"/>
+                                      <a:ea typeface="Cambria Math" panose="02040503050406030204" pitchFamily="18" charset="0"/>
+                                    </a:rPr>
+                                    <m:t>𝑛</m:t>
+                                  </m:r>
+                                </m:sub>
+                              </m:sSub>
+                            </m:num>
+                            <m:den>
+                              <m:sSub>
+                                <m:sSubPr>
+                                  <m:ctrlPr>
+                                    <a:rPr lang="de-DE" b="0" i="1" smtClean="0">
+                                      <a:latin typeface="Cambria Math" panose="02040503050406030204" pitchFamily="18" charset="0"/>
+                                      <a:ea typeface="Cambria Math" panose="02040503050406030204" pitchFamily="18" charset="0"/>
+                                    </a:rPr>
+                                  </m:ctrlPr>
+                                </m:sSubPr>
+                                <m:e>
+                                  <m:r>
+                                    <a:rPr lang="de-DE" b="0" i="1" smtClean="0">
+                                      <a:latin typeface="Cambria Math" panose="02040503050406030204" pitchFamily="18" charset="0"/>
+                                      <a:ea typeface="Cambria Math" panose="02040503050406030204" pitchFamily="18" charset="0"/>
+                                    </a:rPr>
+                                    <m:t>𝑥</m:t>
+                                  </m:r>
+                                </m:e>
+                                <m:sub>
+                                  <m:r>
+                                    <a:rPr lang="de-DE" b="0" i="1" smtClean="0">
+                                      <a:latin typeface="Cambria Math" panose="02040503050406030204" pitchFamily="18" charset="0"/>
+                                      <a:ea typeface="Cambria Math" panose="02040503050406030204" pitchFamily="18" charset="0"/>
+                                    </a:rPr>
+                                    <m:t>𝑛</m:t>
+                                  </m:r>
+                                  <m:r>
+                                    <a:rPr lang="de-DE" b="0" i="1" smtClean="0">
+                                      <a:latin typeface="Cambria Math" panose="02040503050406030204" pitchFamily="18" charset="0"/>
+                                      <a:ea typeface="Cambria Math" panose="02040503050406030204" pitchFamily="18" charset="0"/>
+                                    </a:rPr>
+                                    <m:t>+1</m:t>
+                                  </m:r>
+                                </m:sub>
+                              </m:sSub>
+                            </m:den>
+                          </m:f>
+                          <m:r>
+                            <a:rPr lang="de-DE" b="0" i="1" smtClean="0">
+                              <a:latin typeface="Cambria Math" panose="02040503050406030204" pitchFamily="18" charset="0"/>
+                              <a:ea typeface="Cambria Math" panose="02040503050406030204" pitchFamily="18" charset="0"/>
+                            </a:rPr>
+                            <m:t>=</m:t>
+                          </m:r>
+                          <m:rad>
+                            <m:radPr>
+                              <m:degHide m:val="on"/>
+                              <m:ctrlPr>
+                                <a:rPr lang="de-DE" b="0" i="1" smtClean="0">
+                                  <a:latin typeface="Cambria Math" panose="02040503050406030204" pitchFamily="18" charset="0"/>
+                                  <a:ea typeface="Cambria Math" panose="02040503050406030204" pitchFamily="18" charset="0"/>
+                                </a:rPr>
+                              </m:ctrlPr>
+                            </m:radPr>
+                            <m:deg/>
+                            <m:e>
+                              <m:r>
+                                <a:rPr lang="de-DE" b="0" i="1" smtClean="0">
+                                  <a:latin typeface="Cambria Math" panose="02040503050406030204" pitchFamily="18" charset="0"/>
+                                  <a:ea typeface="Cambria Math" panose="02040503050406030204" pitchFamily="18" charset="0"/>
+                                </a:rPr>
+                                <m:t>2</m:t>
+                              </m:r>
+                            </m:e>
+                          </m:rad>
+                        </m:e>
+                      </m:func>
+                    </m:oMath>
+                  </m:oMathPara>
+                </a14:m>
+                <a:endParaRPr lang="de-DE" dirty="0"/>
+              </a:p>
+              <a:p>
+                <a:endParaRPr lang="de-DE" dirty="0"/>
+              </a:p>
+              <a:p>
+                <a:endParaRPr lang="de-DE" dirty="0"/>
+              </a:p>
+              <a:p>
+                <a:r>
+                  <a:rPr lang="de-DE" dirty="0"/>
+                  <a:t>Probleme:</a:t>
+                </a:r>
+              </a:p>
+              <a:p>
+                <a:pPr lvl="1"/>
+                <a:r>
+                  <a:rPr lang="de-DE" dirty="0"/>
+                  <a:t>Beliebig große Zahlen</a:t>
+                </a:r>
+              </a:p>
+              <a:p>
+                <a:pPr lvl="1"/>
+                <a:r>
+                  <a:rPr lang="de-DE" dirty="0" err="1"/>
+                  <a:t>Exponentiationen</a:t>
+                </a:r>
+                <a:r>
+                  <a:rPr lang="de-DE" dirty="0"/>
+                  <a:t> dauern lange</a:t>
+                </a:r>
+              </a:p>
+              <a:p>
+                <a:pPr lvl="1"/>
+                <a:r>
+                  <a:rPr lang="de-DE" dirty="0"/>
+                  <a:t>Division beliebig genauer Zahlen</a:t>
+                </a:r>
+              </a:p>
+            </p:txBody>
+          </p:sp>
+        </mc:Choice>
+        <mc:Fallback>
+          <p:sp>
+            <p:nvSpPr>
+              <p:cNvPr id="3" name="Inhaltsplatzhalter 2">
+                <a:extLst>
+                  <a:ext uri="{FF2B5EF4-FFF2-40B4-BE49-F238E27FC236}">
+                    <a16:creationId xmlns:a16="http://schemas.microsoft.com/office/drawing/2014/main" id="{AE321ABA-405B-568E-F853-A4D682A067B3}"/>
+                  </a:ext>
+                </a:extLst>
+              </p:cNvPr>
+              <p:cNvSpPr>
+                <a:spLocks noGrp="1" noRot="1" noChangeAspect="1" noMove="1" noResize="1" noEditPoints="1" noAdjustHandles="1" noChangeArrowheads="1" noChangeShapeType="1" noTextEdit="1"/>
+              </p:cNvSpPr>
+              <p:nvPr>
+                <p:ph idx="1"/>
+              </p:nvPr>
+            </p:nvSpPr>
+            <p:spPr>
+              <a:blipFill>
+                <a:blip r:embed="rId3"/>
+                <a:stretch>
+                  <a:fillRect l="-1086"/>
+                </a:stretch>
+              </a:blipFill>
+            </p:spPr>
+            <p:txBody>
+              <a:bodyPr/>
+              <a:lstStyle/>
+              <a:p>
+                <a:r>
+                  <a:rPr lang="de-DE">
+                    <a:noFill/>
+                  </a:rPr>
+                  <a:t> </a:t>
+                </a:r>
+              </a:p>
+            </p:txBody>
+          </p:sp>
+        </mc:Fallback>
+      </mc:AlternateContent>
+      <p:sp>
+        <p:nvSpPr>
+          <p:cNvPr id="4" name="Datumsplatzhalter 3">
+            <a:extLst>
+              <a:ext uri="{FF2B5EF4-FFF2-40B4-BE49-F238E27FC236}">
+                <a16:creationId xmlns:a16="http://schemas.microsoft.com/office/drawing/2014/main" id="{00B5B41B-B4B8-042D-A728-4C625519A3C4}"/>
+              </a:ext>
+            </a:extLst>
+          </p:cNvPr>
+          <p:cNvSpPr>
+            <a:spLocks noGrp="1"/>
+          </p:cNvSpPr>
+          <p:nvPr>
+            <p:ph type="dt" sz="half" idx="10"/>
+          </p:nvPr>
+        </p:nvSpPr>
+        <p:spPr/>
+        <p:txBody>
+          <a:bodyPr/>
+          <a:lstStyle/>
+          <a:p>
+            <a:r>
+              <a:rPr lang="de-DE"/>
+              <a:t>22.08.2023</a:t>
+            </a:r>
+          </a:p>
+        </p:txBody>
+      </p:sp>
+      <p:sp>
+        <p:nvSpPr>
+          <p:cNvPr id="5" name="Fußzeilenplatzhalter 4">
+            <a:extLst>
+              <a:ext uri="{FF2B5EF4-FFF2-40B4-BE49-F238E27FC236}">
+                <a16:creationId xmlns:a16="http://schemas.microsoft.com/office/drawing/2014/main" id="{A03FC7B8-A005-3FBA-616E-D423A307B144}"/>
+              </a:ext>
+            </a:extLst>
+          </p:cNvPr>
+          <p:cNvSpPr>
+            <a:spLocks noGrp="1"/>
+          </p:cNvSpPr>
+          <p:nvPr>
+            <p:ph type="ftr" sz="quarter" idx="11"/>
+          </p:nvPr>
+        </p:nvSpPr>
+        <p:spPr>
+          <a:xfrm>
+            <a:off x="3260271" y="6356350"/>
+            <a:ext cx="5671458" cy="365125"/>
+          </a:xfrm>
+        </p:spPr>
+        <p:txBody>
+          <a:bodyPr/>
+          <a:lstStyle/>
+          <a:p>
+            <a:r>
+              <a:rPr lang="de-DE" dirty="0"/>
+              <a:t>Aufgabe A326 – Team 213 – Noah Schlenker – Leon B. Kniffki – Christian </a:t>
+            </a:r>
+            <a:r>
+              <a:rPr lang="de-DE" dirty="0" err="1"/>
+              <a:t>Krinitsin</a:t>
+            </a:r>
+            <a:endParaRPr lang="de-DE" dirty="0"/>
+          </a:p>
+        </p:txBody>
+      </p:sp>
+      <p:sp>
+        <p:nvSpPr>
+          <p:cNvPr id="6" name="Foliennummernplatzhalter 5">
+            <a:extLst>
+              <a:ext uri="{FF2B5EF4-FFF2-40B4-BE49-F238E27FC236}">
+                <a16:creationId xmlns:a16="http://schemas.microsoft.com/office/drawing/2014/main" id="{DB33F6F9-ED30-61D1-9476-2F261C86DE5D}"/>
+              </a:ext>
+            </a:extLst>
+          </p:cNvPr>
+          <p:cNvSpPr>
+            <a:spLocks noGrp="1"/>
+          </p:cNvSpPr>
+          <p:nvPr>
+            <p:ph type="sldNum" sz="quarter" idx="12"/>
+          </p:nvPr>
+        </p:nvSpPr>
+        <p:spPr/>
+        <p:txBody>
+          <a:bodyPr/>
+          <a:lstStyle/>
+          <a:p>
+            <a:fld id="{AE07E6DF-0E1A-AC44-B689-ED3A3483D2F3}" type="slidenum">
+              <a:rPr lang="de-DE" smtClean="0"/>
+              <a:t>4</a:t>
+            </a:fld>
+            <a:endParaRPr lang="de-DE"/>
+          </a:p>
+        </p:txBody>
+      </p:sp>
+    </p:spTree>
+    <p:extLst>
+      <p:ext uri="{BB962C8B-B14F-4D97-AF65-F5344CB8AC3E}">
+        <p14:creationId xmlns:p14="http://schemas.microsoft.com/office/powerpoint/2010/main" val="1930837926"/>
+      </p:ext>
+    </p:extLst>
+  </p:cSld>
+  <p:clrMapOvr>
+    <a:masterClrMapping/>
+  </p:clrMapOvr>
+</p:sld>
+</file>
+
+<file path=ppt/slides/slide5.xml><?xml version="1.0" encoding="utf-8"?>
+<p:sld xmlns:a="http://schemas.openxmlformats.org/drawingml/2006/main" xmlns:r="http://schemas.openxmlformats.org/officeDocument/2006/relationships" xmlns:p="http://schemas.openxmlformats.org/presentationml/2006/main">
+  <p:cSld>
+    <p:spTree>
+      <p:nvGrpSpPr>
+        <p:cNvPr id="1" name=""/>
+        <p:cNvGrpSpPr/>
+        <p:nvPr/>
+      </p:nvGrpSpPr>
+      <p:grpSpPr>
+        <a:xfrm>
+          <a:off x="0" y="0"/>
+          <a:ext cx="0" cy="0"/>
+          <a:chOff x="0" y="0"/>
+          <a:chExt cx="0" cy="0"/>
+        </a:xfrm>
+      </p:grpSpPr>
       <p:sp>
         <p:nvSpPr>
           <p:cNvPr id="2" name="Titel 1">
@@ -6206,7 +7691,7 @@
           <a:p>
             <a:fld id="{AE07E6DF-0E1A-AC44-B689-ED3A3483D2F3}" type="slidenum">
               <a:rPr lang="de-DE" smtClean="0"/>
-              <a:t>3</a:t>
+              <a:t>5</a:t>
             </a:fld>
             <a:endParaRPr lang="de-DE"/>
           </a:p>
@@ -6225,7 +7710,7 @@
 </p:sld>
 </file>
 
-<file path=ppt/slides/slide4.xml><?xml version="1.0" encoding="utf-8"?>
+<file path=ppt/slides/slide6.xml><?xml version="1.0" encoding="utf-8"?>
 <p:sld xmlns:a="http://schemas.openxmlformats.org/drawingml/2006/main" xmlns:r="http://schemas.openxmlformats.org/officeDocument/2006/relationships" xmlns:p="http://schemas.openxmlformats.org/presentationml/2006/main">
   <p:cSld>
     <p:spTree>
@@ -8384,7 +9869,7 @@
           <a:p>
             <a:fld id="{AE07E6DF-0E1A-AC44-B689-ED3A3483D2F3}" type="slidenum">
               <a:rPr lang="de-DE" smtClean="0"/>
-              <a:t>4</a:t>
+              <a:t>6</a:t>
             </a:fld>
             <a:endParaRPr lang="de-DE"/>
           </a:p>
@@ -8403,7 +9888,7 @@
 </p:sld>
 </file>
 
-<file path=ppt/slides/slide5.xml><?xml version="1.0" encoding="utf-8"?>
+<file path=ppt/slides/slide7.xml><?xml version="1.0" encoding="utf-8"?>
 <p:sld xmlns:a="http://schemas.openxmlformats.org/drawingml/2006/main" xmlns:r="http://schemas.openxmlformats.org/officeDocument/2006/relationships" xmlns:p="http://schemas.openxmlformats.org/presentationml/2006/main">
   <p:cSld>
     <p:spTree>
@@ -9419,7 +10904,7 @@
           <a:p>
             <a:fld id="{AE07E6DF-0E1A-AC44-B689-ED3A3483D2F3}" type="slidenum">
               <a:rPr lang="de-DE" smtClean="0"/>
-              <a:t>5</a:t>
+              <a:t>7</a:t>
             </a:fld>
             <a:endParaRPr lang="de-DE"/>
           </a:p>

</xml_diff>